<commit_message>
Add Palmares theme and user defined alerts
</commit_message>
<xml_diff>
--- a/Formation/Formation Bourse_Benoit.pptx
+++ b/Formation/Formation Bourse_Benoit.pptx
@@ -454,7 +454,7 @@
           <a:p>
             <a:fld id="{17B49B2E-EC6C-4037-9ACB-43BC4863C7EA}" type="datetimeFigureOut">
               <a:rPr lang="en-US" smtClean="0"/>
-              <a:t>1/7/2021</a:t>
+              <a:t>1/9/2021</a:t>
             </a:fld>
             <a:endParaRPr lang="en-US"/>
           </a:p>
@@ -652,7 +652,7 @@
           <a:p>
             <a:fld id="{17B49B2E-EC6C-4037-9ACB-43BC4863C7EA}" type="datetimeFigureOut">
               <a:rPr lang="en-US" smtClean="0"/>
-              <a:t>1/7/2021</a:t>
+              <a:t>1/9/2021</a:t>
             </a:fld>
             <a:endParaRPr lang="en-US"/>
           </a:p>
@@ -860,7 +860,7 @@
           <a:p>
             <a:fld id="{17B49B2E-EC6C-4037-9ACB-43BC4863C7EA}" type="datetimeFigureOut">
               <a:rPr lang="en-US" smtClean="0"/>
-              <a:t>1/7/2021</a:t>
+              <a:t>1/9/2021</a:t>
             </a:fld>
             <a:endParaRPr lang="en-US"/>
           </a:p>
@@ -1058,7 +1058,7 @@
           <a:p>
             <a:fld id="{17B49B2E-EC6C-4037-9ACB-43BC4863C7EA}" type="datetimeFigureOut">
               <a:rPr lang="en-US" smtClean="0"/>
-              <a:t>1/7/2021</a:t>
+              <a:t>1/9/2021</a:t>
             </a:fld>
             <a:endParaRPr lang="en-US"/>
           </a:p>
@@ -1333,7 +1333,7 @@
           <a:p>
             <a:fld id="{17B49B2E-EC6C-4037-9ACB-43BC4863C7EA}" type="datetimeFigureOut">
               <a:rPr lang="en-US" smtClean="0"/>
-              <a:t>1/7/2021</a:t>
+              <a:t>1/9/2021</a:t>
             </a:fld>
             <a:endParaRPr lang="en-US"/>
           </a:p>
@@ -1598,7 +1598,7 @@
           <a:p>
             <a:fld id="{17B49B2E-EC6C-4037-9ACB-43BC4863C7EA}" type="datetimeFigureOut">
               <a:rPr lang="en-US" smtClean="0"/>
-              <a:t>1/7/2021</a:t>
+              <a:t>1/9/2021</a:t>
             </a:fld>
             <a:endParaRPr lang="en-US"/>
           </a:p>
@@ -2010,7 +2010,7 @@
           <a:p>
             <a:fld id="{17B49B2E-EC6C-4037-9ACB-43BC4863C7EA}" type="datetimeFigureOut">
               <a:rPr lang="en-US" smtClean="0"/>
-              <a:t>1/7/2021</a:t>
+              <a:t>1/9/2021</a:t>
             </a:fld>
             <a:endParaRPr lang="en-US"/>
           </a:p>
@@ -2151,7 +2151,7 @@
           <a:p>
             <a:fld id="{17B49B2E-EC6C-4037-9ACB-43BC4863C7EA}" type="datetimeFigureOut">
               <a:rPr lang="en-US" smtClean="0"/>
-              <a:t>1/7/2021</a:t>
+              <a:t>1/9/2021</a:t>
             </a:fld>
             <a:endParaRPr lang="en-US"/>
           </a:p>
@@ -2264,7 +2264,7 @@
           <a:p>
             <a:fld id="{17B49B2E-EC6C-4037-9ACB-43BC4863C7EA}" type="datetimeFigureOut">
               <a:rPr lang="en-US" smtClean="0"/>
-              <a:t>1/7/2021</a:t>
+              <a:t>1/9/2021</a:t>
             </a:fld>
             <a:endParaRPr lang="en-US"/>
           </a:p>
@@ -2575,7 +2575,7 @@
           <a:p>
             <a:fld id="{17B49B2E-EC6C-4037-9ACB-43BC4863C7EA}" type="datetimeFigureOut">
               <a:rPr lang="en-US" smtClean="0"/>
-              <a:t>1/7/2021</a:t>
+              <a:t>1/9/2021</a:t>
             </a:fld>
             <a:endParaRPr lang="en-US"/>
           </a:p>
@@ -2863,7 +2863,7 @@
           <a:p>
             <a:fld id="{17B49B2E-EC6C-4037-9ACB-43BC4863C7EA}" type="datetimeFigureOut">
               <a:rPr lang="en-US" smtClean="0"/>
-              <a:t>1/7/2021</a:t>
+              <a:t>1/9/2021</a:t>
             </a:fld>
             <a:endParaRPr lang="en-US"/>
           </a:p>
@@ -3104,7 +3104,7 @@
           <a:p>
             <a:fld id="{17B49B2E-EC6C-4037-9ACB-43BC4863C7EA}" type="datetimeFigureOut">
               <a:rPr lang="en-US" smtClean="0"/>
-              <a:t>1/7/2021</a:t>
+              <a:t>1/9/2021</a:t>
             </a:fld>
             <a:endParaRPr lang="en-US"/>
           </a:p>
@@ -9543,14 +9543,20 @@
         </p:nvSpPr>
         <p:spPr/>
         <p:txBody>
-          <a:bodyPr/>
-          <a:lstStyle/>
-          <a:p>
-            <a:r>
-              <a:rPr lang="fr-FR" dirty="0"/>
+          <a:bodyPr vert="horz" lIns="91440" tIns="45720" rIns="91440" bIns="45720" rtlCol="0" anchor="t">
+            <a:normAutofit/>
+          </a:bodyPr>
+          <a:lstStyle/>
+          <a:p>
+            <a:r>
+              <a:rPr lang="fr-FR" dirty="0">
+                <a:cs typeface="Calibri Light"/>
+              </a:rPr>
               <a:t>Les indicateurs</a:t>
             </a:r>
-            <a:endParaRPr lang="en-US" dirty="0"/>
+            <a:endParaRPr lang="en-US" dirty="0">
+              <a:cs typeface="Calibri Light"/>
+            </a:endParaRPr>
           </a:p>
         </p:txBody>
       </p:sp>
@@ -9798,76 +9804,12 @@
           <a:chExt cx="0" cy="0"/>
         </a:xfrm>
       </p:grpSpPr>
-      <p:sp>
-        <p:nvSpPr>
-          <p:cNvPr id="2" name="Titre 1">
-            <a:extLst>
-              <a:ext uri="{FF2B5EF4-FFF2-40B4-BE49-F238E27FC236}">
-                <a16:creationId xmlns:a16="http://schemas.microsoft.com/office/drawing/2014/main" id="{B7DF19AE-D648-4B40-ADB8-33024CE59765}"/>
-              </a:ext>
-            </a:extLst>
-          </p:cNvPr>
-          <p:cNvSpPr>
-            <a:spLocks noGrp="1"/>
-          </p:cNvSpPr>
-          <p:nvPr>
-            <p:ph type="title"/>
-          </p:nvPr>
-        </p:nvSpPr>
-        <p:spPr/>
-        <p:txBody>
-          <a:bodyPr/>
-          <a:lstStyle/>
-          <a:p>
-            <a:r>
-              <a:rPr lang="fr-FR" dirty="0">
-                <a:cs typeface="Calibri Light"/>
-              </a:rPr>
-              <a:t>ROR – Rate Of Rise (Taux de croissance)</a:t>
-            </a:r>
-            <a:endParaRPr lang="fr-FR" dirty="0"/>
-          </a:p>
-        </p:txBody>
-      </p:sp>
-      <p:sp>
-        <p:nvSpPr>
-          <p:cNvPr id="3" name="Espace réservé du contenu 2">
-            <a:extLst>
-              <a:ext uri="{FF2B5EF4-FFF2-40B4-BE49-F238E27FC236}">
-                <a16:creationId xmlns:a16="http://schemas.microsoft.com/office/drawing/2014/main" id="{7D5898EE-1060-4735-824B-A9FB9A3416A4}"/>
-              </a:ext>
-            </a:extLst>
-          </p:cNvPr>
-          <p:cNvSpPr>
-            <a:spLocks noGrp="1"/>
-          </p:cNvSpPr>
-          <p:nvPr>
-            <p:ph idx="1"/>
-          </p:nvPr>
-        </p:nvSpPr>
-        <p:spPr/>
-        <p:txBody>
-          <a:bodyPr vert="horz" lIns="91440" tIns="45720" rIns="91440" bIns="45720" rtlCol="0" anchor="t">
-            <a:normAutofit/>
-          </a:bodyPr>
-          <a:lstStyle/>
-          <a:p>
-            <a:r>
-              <a:rPr lang="fr-FR" dirty="0">
-                <a:cs typeface="Calibri"/>
-              </a:rPr>
-              <a:t>Mesure la progression entre le plus bas et la dernière valeur</a:t>
-            </a:r>
-            <a:endParaRPr lang="fr-FR" dirty="0"/>
-          </a:p>
-        </p:txBody>
-      </p:sp>
       <p:pic>
         <p:nvPicPr>
-          <p:cNvPr id="5" name="Picture 4">
-            <a:extLst>
-              <a:ext uri="{FF2B5EF4-FFF2-40B4-BE49-F238E27FC236}">
-                <a16:creationId xmlns:a16="http://schemas.microsoft.com/office/drawing/2014/main" id="{B36B8853-C435-439B-976A-9C3E6512BCCF}"/>
+          <p:cNvPr id="6" name="Picture 5">
+            <a:extLst>
+              <a:ext uri="{FF2B5EF4-FFF2-40B4-BE49-F238E27FC236}">
+                <a16:creationId xmlns:a16="http://schemas.microsoft.com/office/drawing/2014/main" id="{41A4541D-7B47-4419-9F8D-429E055ACAF6}"/>
               </a:ext>
             </a:extLst>
           </p:cNvPr>
@@ -9884,14 +9826,78 @@
         </p:blipFill>
         <p:spPr>
           <a:xfrm>
-            <a:off x="487326" y="2329380"/>
-            <a:ext cx="11388284" cy="4163495"/>
+            <a:off x="1072997" y="2432277"/>
+            <a:ext cx="9067800" cy="3752850"/>
           </a:xfrm>
           <a:prstGeom prst="rect">
             <a:avLst/>
           </a:prstGeom>
         </p:spPr>
       </p:pic>
+      <p:sp>
+        <p:nvSpPr>
+          <p:cNvPr id="2" name="Titre 1">
+            <a:extLst>
+              <a:ext uri="{FF2B5EF4-FFF2-40B4-BE49-F238E27FC236}">
+                <a16:creationId xmlns:a16="http://schemas.microsoft.com/office/drawing/2014/main" id="{B7DF19AE-D648-4B40-ADB8-33024CE59765}"/>
+              </a:ext>
+            </a:extLst>
+          </p:cNvPr>
+          <p:cNvSpPr>
+            <a:spLocks noGrp="1"/>
+          </p:cNvSpPr>
+          <p:nvPr>
+            <p:ph type="title"/>
+          </p:nvPr>
+        </p:nvSpPr>
+        <p:spPr/>
+        <p:txBody>
+          <a:bodyPr/>
+          <a:lstStyle/>
+          <a:p>
+            <a:r>
+              <a:rPr lang="fr-FR" dirty="0">
+                <a:cs typeface="Calibri Light"/>
+              </a:rPr>
+              <a:t>ROR – Rate Of Rise (Taux de croissance)</a:t>
+            </a:r>
+            <a:endParaRPr lang="fr-FR" dirty="0"/>
+          </a:p>
+        </p:txBody>
+      </p:sp>
+      <p:sp>
+        <p:nvSpPr>
+          <p:cNvPr id="3" name="Espace réservé du contenu 2">
+            <a:extLst>
+              <a:ext uri="{FF2B5EF4-FFF2-40B4-BE49-F238E27FC236}">
+                <a16:creationId xmlns:a16="http://schemas.microsoft.com/office/drawing/2014/main" id="{7D5898EE-1060-4735-824B-A9FB9A3416A4}"/>
+              </a:ext>
+            </a:extLst>
+          </p:cNvPr>
+          <p:cNvSpPr>
+            <a:spLocks noGrp="1"/>
+          </p:cNvSpPr>
+          <p:nvPr>
+            <p:ph idx="1"/>
+          </p:nvPr>
+        </p:nvSpPr>
+        <p:spPr/>
+        <p:txBody>
+          <a:bodyPr vert="horz" lIns="91440" tIns="45720" rIns="91440" bIns="45720" rtlCol="0" anchor="t">
+            <a:normAutofit/>
+          </a:bodyPr>
+          <a:lstStyle/>
+          <a:p>
+            <a:r>
+              <a:rPr lang="fr-FR" dirty="0">
+                <a:cs typeface="Calibri"/>
+              </a:rPr>
+              <a:t>Mesure la progression entre le plus bas et la dernière valeur</a:t>
+            </a:r>
+            <a:endParaRPr lang="fr-FR" dirty="0"/>
+          </a:p>
+        </p:txBody>
+      </p:sp>
       <p:cxnSp>
         <p:nvCxnSpPr>
           <p:cNvPr id="7" name="Straight Arrow Connector 6">
@@ -9901,13 +9907,15 @@
               </a:ext>
             </a:extLst>
           </p:cNvPr>
-          <p:cNvCxnSpPr/>
+          <p:cNvCxnSpPr>
+            <a:cxnSpLocks/>
+          </p:cNvCxnSpPr>
           <p:nvPr/>
         </p:nvCxnSpPr>
         <p:spPr>
           <a:xfrm flipV="1">
-            <a:off x="7866498" y="3889600"/>
-            <a:ext cx="3115340" cy="1180214"/>
+            <a:off x="6537423" y="3141909"/>
+            <a:ext cx="2955363" cy="1713378"/>
           </a:xfrm>
           <a:prstGeom prst="straightConnector1">
             <a:avLst/>
@@ -9945,7 +9953,7 @@
         </p:nvSpPr>
         <p:spPr>
           <a:xfrm>
-            <a:off x="9424168" y="4411127"/>
+            <a:off x="8015104" y="3939370"/>
             <a:ext cx="583814" cy="369332"/>
           </a:xfrm>
           <a:prstGeom prst="rect">
@@ -9961,7 +9969,7 @@
           <a:p>
             <a:r>
               <a:rPr lang="fr-FR" dirty="0"/>
-              <a:t>25%</a:t>
+              <a:t>45%</a:t>
             </a:r>
             <a:endParaRPr lang="en-US" dirty="0"/>
           </a:p>
@@ -9997,76 +10005,12 @@
           <a:chExt cx="0" cy="0"/>
         </a:xfrm>
       </p:grpSpPr>
-      <p:sp>
-        <p:nvSpPr>
-          <p:cNvPr id="2" name="Titre 1">
-            <a:extLst>
-              <a:ext uri="{FF2B5EF4-FFF2-40B4-BE49-F238E27FC236}">
-                <a16:creationId xmlns:a16="http://schemas.microsoft.com/office/drawing/2014/main" id="{BEE9FB4E-D598-4BFC-93D6-ACC08EF7BED0}"/>
-              </a:ext>
-            </a:extLst>
-          </p:cNvPr>
-          <p:cNvSpPr>
-            <a:spLocks noGrp="1"/>
-          </p:cNvSpPr>
-          <p:nvPr>
-            <p:ph type="title"/>
-          </p:nvPr>
-        </p:nvSpPr>
-        <p:spPr/>
-        <p:txBody>
-          <a:bodyPr/>
-          <a:lstStyle/>
-          <a:p>
-            <a:r>
-              <a:rPr lang="fr-FR" dirty="0" err="1">
-                <a:cs typeface="Calibri Light"/>
-              </a:rPr>
-              <a:t>Highest</a:t>
-            </a:r>
-            <a:endParaRPr lang="fr-FR" dirty="0"/>
-          </a:p>
-        </p:txBody>
-      </p:sp>
-      <p:sp>
-        <p:nvSpPr>
-          <p:cNvPr id="3" name="Espace réservé du contenu 2">
-            <a:extLst>
-              <a:ext uri="{FF2B5EF4-FFF2-40B4-BE49-F238E27FC236}">
-                <a16:creationId xmlns:a16="http://schemas.microsoft.com/office/drawing/2014/main" id="{42945217-D273-41C2-B099-7B3485837378}"/>
-              </a:ext>
-            </a:extLst>
-          </p:cNvPr>
-          <p:cNvSpPr>
-            <a:spLocks noGrp="1"/>
-          </p:cNvSpPr>
-          <p:nvPr>
-            <p:ph idx="1"/>
-          </p:nvPr>
-        </p:nvSpPr>
-        <p:spPr/>
-        <p:txBody>
-          <a:bodyPr vert="horz" lIns="91440" tIns="45720" rIns="91440" bIns="45720" rtlCol="0" anchor="t">
-            <a:normAutofit/>
-          </a:bodyPr>
-          <a:lstStyle/>
-          <a:p>
-            <a:r>
-              <a:rPr lang="fr-FR" dirty="0">
-                <a:cs typeface="Calibri"/>
-              </a:rPr>
-              <a:t>Calcule le nombre de barre dans le passé, dépassées par la barre en cours</a:t>
-            </a:r>
-            <a:endParaRPr lang="fr-FR" dirty="0"/>
-          </a:p>
-        </p:txBody>
-      </p:sp>
       <p:pic>
         <p:nvPicPr>
-          <p:cNvPr id="4" name="Picture 3">
-            <a:extLst>
-              <a:ext uri="{FF2B5EF4-FFF2-40B4-BE49-F238E27FC236}">
-                <a16:creationId xmlns:a16="http://schemas.microsoft.com/office/drawing/2014/main" id="{EAA7C2C2-24A3-4727-9869-2109DE8C525C}"/>
+          <p:cNvPr id="9" name="Picture 8">
+            <a:extLst>
+              <a:ext uri="{FF2B5EF4-FFF2-40B4-BE49-F238E27FC236}">
+                <a16:creationId xmlns:a16="http://schemas.microsoft.com/office/drawing/2014/main" id="{3D18CC15-F393-451D-8C17-9301D92CEA7F}"/>
               </a:ext>
             </a:extLst>
           </p:cNvPr>
@@ -10083,20 +10027,94 @@
         </p:blipFill>
         <p:spPr>
           <a:xfrm>
-            <a:off x="487326" y="2329380"/>
-            <a:ext cx="11388284" cy="4163495"/>
+            <a:off x="2624137" y="2125196"/>
+            <a:ext cx="6943725" cy="3752850"/>
           </a:xfrm>
           <a:prstGeom prst="rect">
             <a:avLst/>
           </a:prstGeom>
         </p:spPr>
       </p:pic>
+      <p:sp>
+        <p:nvSpPr>
+          <p:cNvPr id="2" name="Titre 1">
+            <a:extLst>
+              <a:ext uri="{FF2B5EF4-FFF2-40B4-BE49-F238E27FC236}">
+                <a16:creationId xmlns:a16="http://schemas.microsoft.com/office/drawing/2014/main" id="{BEE9FB4E-D598-4BFC-93D6-ACC08EF7BED0}"/>
+              </a:ext>
+            </a:extLst>
+          </p:cNvPr>
+          <p:cNvSpPr>
+            <a:spLocks noGrp="1"/>
+          </p:cNvSpPr>
+          <p:nvPr>
+            <p:ph type="title"/>
+          </p:nvPr>
+        </p:nvSpPr>
+        <p:spPr>
+          <a:xfrm>
+            <a:off x="838200" y="365125"/>
+            <a:ext cx="10515600" cy="748683"/>
+          </a:xfrm>
+        </p:spPr>
+        <p:txBody>
+          <a:bodyPr anchor="t"/>
+          <a:lstStyle/>
+          <a:p>
+            <a:r>
+              <a:rPr lang="fr-FR" dirty="0" err="1">
+                <a:cs typeface="Calibri Light"/>
+              </a:rPr>
+              <a:t>Highest</a:t>
+            </a:r>
+            <a:endParaRPr lang="fr-FR" dirty="0"/>
+          </a:p>
+        </p:txBody>
+      </p:sp>
+      <p:sp>
+        <p:nvSpPr>
+          <p:cNvPr id="3" name="Espace réservé du contenu 2">
+            <a:extLst>
+              <a:ext uri="{FF2B5EF4-FFF2-40B4-BE49-F238E27FC236}">
+                <a16:creationId xmlns:a16="http://schemas.microsoft.com/office/drawing/2014/main" id="{42945217-D273-41C2-B099-7B3485837378}"/>
+              </a:ext>
+            </a:extLst>
+          </p:cNvPr>
+          <p:cNvSpPr>
+            <a:spLocks noGrp="1"/>
+          </p:cNvSpPr>
+          <p:nvPr>
+            <p:ph idx="1"/>
+          </p:nvPr>
+        </p:nvSpPr>
+        <p:spPr>
+          <a:xfrm>
+            <a:off x="838200" y="1111556"/>
+            <a:ext cx="10515600" cy="785040"/>
+          </a:xfrm>
+        </p:spPr>
+        <p:txBody>
+          <a:bodyPr vert="horz" lIns="91440" tIns="45720" rIns="91440" bIns="45720" rtlCol="0" anchor="t">
+            <a:normAutofit lnSpcReduction="10000"/>
+          </a:bodyPr>
+          <a:lstStyle/>
+          <a:p>
+            <a:r>
+              <a:rPr lang="fr-FR" dirty="0">
+                <a:cs typeface="Calibri"/>
+              </a:rPr>
+              <a:t>Calcule le nombre de barre dans le passé, dépassées par la barre en cours</a:t>
+            </a:r>
+            <a:endParaRPr lang="fr-FR" dirty="0"/>
+          </a:p>
+        </p:txBody>
+      </p:sp>
       <p:cxnSp>
         <p:nvCxnSpPr>
-          <p:cNvPr id="6" name="Straight Arrow Connector 5">
-            <a:extLst>
-              <a:ext uri="{FF2B5EF4-FFF2-40B4-BE49-F238E27FC236}">
-                <a16:creationId xmlns:a16="http://schemas.microsoft.com/office/drawing/2014/main" id="{D539F359-F1E9-4EBF-8C01-72D4AD7C5508}"/>
+          <p:cNvPr id="8" name="Straight Arrow Connector 7">
+            <a:extLst>
+              <a:ext uri="{FF2B5EF4-FFF2-40B4-BE49-F238E27FC236}">
+                <a16:creationId xmlns:a16="http://schemas.microsoft.com/office/drawing/2014/main" id="{94D1475B-F785-4AC9-9093-791BAA598A12}"/>
               </a:ext>
             </a:extLst>
           </p:cNvPr>
@@ -10107,8 +10125,8 @@
         </p:nvCxnSpPr>
         <p:spPr>
           <a:xfrm flipH="1">
-            <a:off x="998621" y="4090738"/>
-            <a:ext cx="1340974" cy="0"/>
+            <a:off x="6606540" y="3417570"/>
+            <a:ext cx="2113656" cy="11430"/>
           </a:xfrm>
           <a:prstGeom prst="straightConnector1">
             <a:avLst/>
@@ -10134,10 +10152,10 @@
       </p:cxnSp>
       <p:sp>
         <p:nvSpPr>
-          <p:cNvPr id="7" name="TextBox 6">
-            <a:extLst>
-              <a:ext uri="{FF2B5EF4-FFF2-40B4-BE49-F238E27FC236}">
-                <a16:creationId xmlns:a16="http://schemas.microsoft.com/office/drawing/2014/main" id="{7C507E46-8A73-4337-B9E1-6450044C5FDD}"/>
+          <p:cNvPr id="10" name="TextBox 9">
+            <a:extLst>
+              <a:ext uri="{FF2B5EF4-FFF2-40B4-BE49-F238E27FC236}">
+                <a16:creationId xmlns:a16="http://schemas.microsoft.com/office/drawing/2014/main" id="{76F2466A-9C75-4745-A222-9FB535EFAC4E}"/>
               </a:ext>
             </a:extLst>
           </p:cNvPr>
@@ -10146,8 +10164,8 @@
         </p:nvSpPr>
         <p:spPr>
           <a:xfrm>
-            <a:off x="1148467" y="3725598"/>
-            <a:ext cx="1186735" cy="369332"/>
+            <a:off x="7170018" y="3024047"/>
+            <a:ext cx="1069716" cy="369332"/>
           </a:xfrm>
           <a:prstGeom prst="rect">
             <a:avLst/>
@@ -10162,7 +10180,7 @@
           <a:p>
             <a:r>
               <a:rPr lang="fr-FR" dirty="0"/>
-              <a:t>150 Barres</a:t>
+              <a:t>25 Barres</a:t>
             </a:r>
             <a:endParaRPr lang="en-US" dirty="0"/>
           </a:p>
@@ -10170,10 +10188,10 @@
       </p:sp>
       <p:cxnSp>
         <p:nvCxnSpPr>
-          <p:cNvPr id="8" name="Straight Arrow Connector 7">
-            <a:extLst>
-              <a:ext uri="{FF2B5EF4-FFF2-40B4-BE49-F238E27FC236}">
-                <a16:creationId xmlns:a16="http://schemas.microsoft.com/office/drawing/2014/main" id="{94D1475B-F785-4AC9-9093-791BAA598A12}"/>
+          <p:cNvPr id="12" name="Straight Arrow Connector 11">
+            <a:extLst>
+              <a:ext uri="{FF2B5EF4-FFF2-40B4-BE49-F238E27FC236}">
+                <a16:creationId xmlns:a16="http://schemas.microsoft.com/office/drawing/2014/main" id="{F8E21D57-1F34-460E-B48A-0E8B31C2D1C4}"/>
               </a:ext>
             </a:extLst>
           </p:cNvPr>
@@ -10184,8 +10202,8 @@
         </p:nvCxnSpPr>
         <p:spPr>
           <a:xfrm flipH="1">
-            <a:off x="5787189" y="3112168"/>
-            <a:ext cx="2521526" cy="0"/>
+            <a:off x="4312118" y="3001187"/>
+            <a:ext cx="1711399" cy="0"/>
           </a:xfrm>
           <a:prstGeom prst="straightConnector1">
             <a:avLst/>
@@ -10211,10 +10229,10 @@
       </p:cxnSp>
       <p:sp>
         <p:nvSpPr>
-          <p:cNvPr id="10" name="TextBox 9">
-            <a:extLst>
-              <a:ext uri="{FF2B5EF4-FFF2-40B4-BE49-F238E27FC236}">
-                <a16:creationId xmlns:a16="http://schemas.microsoft.com/office/drawing/2014/main" id="{76F2466A-9C75-4745-A222-9FB535EFAC4E}"/>
+          <p:cNvPr id="14" name="TextBox 13">
+            <a:extLst>
+              <a:ext uri="{FF2B5EF4-FFF2-40B4-BE49-F238E27FC236}">
+                <a16:creationId xmlns:a16="http://schemas.microsoft.com/office/drawing/2014/main" id="{82A4013A-DA1B-4596-8CF6-61E18E3FE4C8}"/>
               </a:ext>
             </a:extLst>
           </p:cNvPr>
@@ -10223,84 +10241,7 @@
         </p:nvSpPr>
         <p:spPr>
           <a:xfrm>
-            <a:off x="6689557" y="2787670"/>
-            <a:ext cx="1069716" cy="369332"/>
-          </a:xfrm>
-          <a:prstGeom prst="rect">
-            <a:avLst/>
-          </a:prstGeom>
-          <a:noFill/>
-        </p:spPr>
-        <p:txBody>
-          <a:bodyPr wrap="none" rtlCol="0">
-            <a:spAutoFit/>
-          </a:bodyPr>
-          <a:lstStyle/>
-          <a:p>
-            <a:r>
-              <a:rPr lang="fr-FR" dirty="0"/>
-              <a:t>30 Barres</a:t>
-            </a:r>
-            <a:endParaRPr lang="en-US" dirty="0"/>
-          </a:p>
-        </p:txBody>
-      </p:sp>
-      <p:cxnSp>
-        <p:nvCxnSpPr>
-          <p:cNvPr id="12" name="Straight Arrow Connector 11">
-            <a:extLst>
-              <a:ext uri="{FF2B5EF4-FFF2-40B4-BE49-F238E27FC236}">
-                <a16:creationId xmlns:a16="http://schemas.microsoft.com/office/drawing/2014/main" id="{F8E21D57-1F34-460E-B48A-0E8B31C2D1C4}"/>
-              </a:ext>
-            </a:extLst>
-          </p:cNvPr>
-          <p:cNvCxnSpPr>
-            <a:cxnSpLocks/>
-          </p:cNvCxnSpPr>
-          <p:nvPr/>
-        </p:nvCxnSpPr>
-        <p:spPr>
-          <a:xfrm flipH="1">
-            <a:off x="6460958" y="3645385"/>
-            <a:ext cx="1711399" cy="0"/>
-          </a:xfrm>
-          <a:prstGeom prst="straightConnector1">
-            <a:avLst/>
-          </a:prstGeom>
-          <a:ln w="25400">
-            <a:tailEnd type="triangle" w="lg" len="lg"/>
-          </a:ln>
-        </p:spPr>
-        <p:style>
-          <a:lnRef idx="1">
-            <a:schemeClr val="accent1"/>
-          </a:lnRef>
-          <a:fillRef idx="0">
-            <a:schemeClr val="accent1"/>
-          </a:fillRef>
-          <a:effectRef idx="0">
-            <a:schemeClr val="accent1"/>
-          </a:effectRef>
-          <a:fontRef idx="minor">
-            <a:schemeClr val="tx1"/>
-          </a:fontRef>
-        </p:style>
-      </p:cxnSp>
-      <p:sp>
-        <p:nvSpPr>
-          <p:cNvPr id="14" name="TextBox 13">
-            <a:extLst>
-              <a:ext uri="{FF2B5EF4-FFF2-40B4-BE49-F238E27FC236}">
-                <a16:creationId xmlns:a16="http://schemas.microsoft.com/office/drawing/2014/main" id="{82A4013A-DA1B-4596-8CF6-61E18E3FE4C8}"/>
-              </a:ext>
-            </a:extLst>
-          </p:cNvPr>
-          <p:cNvSpPr txBox="1"/>
-          <p:nvPr/>
-        </p:nvSpPr>
-        <p:spPr>
-          <a:xfrm>
-            <a:off x="6689557" y="3287225"/>
+            <a:off x="4540717" y="2643027"/>
             <a:ext cx="1069716" cy="369332"/>
           </a:xfrm>
           <a:prstGeom prst="rect">
@@ -10352,76 +10293,12 @@
           <a:chExt cx="0" cy="0"/>
         </a:xfrm>
       </p:grpSpPr>
-      <p:sp>
-        <p:nvSpPr>
-          <p:cNvPr id="2" name="Titre 1">
-            <a:extLst>
-              <a:ext uri="{FF2B5EF4-FFF2-40B4-BE49-F238E27FC236}">
-                <a16:creationId xmlns:a16="http://schemas.microsoft.com/office/drawing/2014/main" id="{2F1C73A9-4855-46BB-876E-56D16E6D2EF4}"/>
-              </a:ext>
-            </a:extLst>
-          </p:cNvPr>
-          <p:cNvSpPr>
-            <a:spLocks noGrp="1"/>
-          </p:cNvSpPr>
-          <p:nvPr>
-            <p:ph type="title"/>
-          </p:nvPr>
-        </p:nvSpPr>
-        <p:spPr/>
-        <p:txBody>
-          <a:bodyPr/>
-          <a:lstStyle/>
-          <a:p>
-            <a:r>
-              <a:rPr lang="fr-FR" dirty="0">
-                <a:cs typeface="Calibri Light"/>
-              </a:rPr>
-              <a:t>STOKFBODY - Stochastique</a:t>
-            </a:r>
-            <a:endParaRPr lang="fr-FR" dirty="0"/>
-          </a:p>
-        </p:txBody>
-      </p:sp>
-      <p:sp>
-        <p:nvSpPr>
-          <p:cNvPr id="3" name="Espace réservé du contenu 2">
-            <a:extLst>
-              <a:ext uri="{FF2B5EF4-FFF2-40B4-BE49-F238E27FC236}">
-                <a16:creationId xmlns:a16="http://schemas.microsoft.com/office/drawing/2014/main" id="{F41CF238-FAF3-431A-AD60-1FF14429A911}"/>
-              </a:ext>
-            </a:extLst>
-          </p:cNvPr>
-          <p:cNvSpPr>
-            <a:spLocks noGrp="1"/>
-          </p:cNvSpPr>
-          <p:nvPr>
-            <p:ph idx="1"/>
-          </p:nvPr>
-        </p:nvSpPr>
-        <p:spPr/>
-        <p:txBody>
-          <a:bodyPr vert="horz" lIns="91440" tIns="45720" rIns="91440" bIns="45720" rtlCol="0" anchor="t">
-            <a:normAutofit/>
-          </a:bodyPr>
-          <a:lstStyle/>
-          <a:p>
-            <a:r>
-              <a:rPr lang="fr-FR" dirty="0">
-                <a:cs typeface="Calibri"/>
-              </a:rPr>
-              <a:t>Position de la barre en cours par rapport au plus haut et plus bas</a:t>
-            </a:r>
-            <a:endParaRPr lang="fr-FR" dirty="0"/>
-          </a:p>
-        </p:txBody>
-      </p:sp>
       <p:pic>
         <p:nvPicPr>
-          <p:cNvPr id="5" name="Picture 4">
-            <a:extLst>
-              <a:ext uri="{FF2B5EF4-FFF2-40B4-BE49-F238E27FC236}">
-                <a16:creationId xmlns:a16="http://schemas.microsoft.com/office/drawing/2014/main" id="{C3C1FB1E-2FD4-4BA9-898B-E97951A55CB6}"/>
+          <p:cNvPr id="6" name="Picture 5">
+            <a:extLst>
+              <a:ext uri="{FF2B5EF4-FFF2-40B4-BE49-F238E27FC236}">
+                <a16:creationId xmlns:a16="http://schemas.microsoft.com/office/drawing/2014/main" id="{63EFBC19-DD9D-466C-AC3E-82C73ED2FECF}"/>
               </a:ext>
             </a:extLst>
           </p:cNvPr>
@@ -10438,14 +10315,89 @@
         </p:blipFill>
         <p:spPr>
           <a:xfrm>
-            <a:off x="561473" y="2475664"/>
-            <a:ext cx="9629274" cy="3675146"/>
+            <a:off x="1168567" y="2351267"/>
+            <a:ext cx="9353550" cy="3752850"/>
           </a:xfrm>
           <a:prstGeom prst="rect">
             <a:avLst/>
           </a:prstGeom>
         </p:spPr>
       </p:pic>
+      <p:sp>
+        <p:nvSpPr>
+          <p:cNvPr id="2" name="Titre 1">
+            <a:extLst>
+              <a:ext uri="{FF2B5EF4-FFF2-40B4-BE49-F238E27FC236}">
+                <a16:creationId xmlns:a16="http://schemas.microsoft.com/office/drawing/2014/main" id="{2F1C73A9-4855-46BB-876E-56D16E6D2EF4}"/>
+              </a:ext>
+            </a:extLst>
+          </p:cNvPr>
+          <p:cNvSpPr>
+            <a:spLocks noGrp="1"/>
+          </p:cNvSpPr>
+          <p:nvPr>
+            <p:ph type="title"/>
+          </p:nvPr>
+        </p:nvSpPr>
+        <p:spPr>
+          <a:xfrm>
+            <a:off x="838200" y="365126"/>
+            <a:ext cx="10515600" cy="674800"/>
+          </a:xfrm>
+        </p:spPr>
+        <p:txBody>
+          <a:bodyPr vert="horz" lIns="91440" tIns="45720" rIns="91440" bIns="45720" rtlCol="0" anchor="t">
+            <a:normAutofit fontScale="90000"/>
+          </a:bodyPr>
+          <a:lstStyle/>
+          <a:p>
+            <a:r>
+              <a:rPr lang="fr-FR" dirty="0">
+                <a:cs typeface="Calibri Light"/>
+              </a:rPr>
+              <a:t>STOKFBODY - Stochastique</a:t>
+            </a:r>
+          </a:p>
+        </p:txBody>
+      </p:sp>
+      <p:sp>
+        <p:nvSpPr>
+          <p:cNvPr id="3" name="Espace réservé du contenu 2">
+            <a:extLst>
+              <a:ext uri="{FF2B5EF4-FFF2-40B4-BE49-F238E27FC236}">
+                <a16:creationId xmlns:a16="http://schemas.microsoft.com/office/drawing/2014/main" id="{F41CF238-FAF3-431A-AD60-1FF14429A911}"/>
+              </a:ext>
+            </a:extLst>
+          </p:cNvPr>
+          <p:cNvSpPr>
+            <a:spLocks noGrp="1"/>
+          </p:cNvSpPr>
+          <p:nvPr>
+            <p:ph idx="1"/>
+          </p:nvPr>
+        </p:nvSpPr>
+        <p:spPr>
+          <a:xfrm>
+            <a:off x="587542" y="1039926"/>
+            <a:ext cx="10515600" cy="568110"/>
+          </a:xfrm>
+        </p:spPr>
+        <p:txBody>
+          <a:bodyPr vert="horz" lIns="91440" tIns="45720" rIns="91440" bIns="45720" rtlCol="0" anchor="t">
+            <a:normAutofit/>
+          </a:bodyPr>
+          <a:lstStyle/>
+          <a:p>
+            <a:r>
+              <a:rPr lang="fr-FR" dirty="0">
+                <a:cs typeface="Calibri"/>
+              </a:rPr>
+              <a:t>Position de la barre en cours par rapport au plus haut et plus bas</a:t>
+            </a:r>
+            <a:endParaRPr lang="fr-FR" dirty="0"/>
+          </a:p>
+        </p:txBody>
+      </p:sp>
       <p:cxnSp>
         <p:nvCxnSpPr>
           <p:cNvPr id="7" name="Straight Connector 6">
@@ -10462,12 +10414,13 @@
         </p:nvCxnSpPr>
         <p:spPr>
           <a:xfrm>
-            <a:off x="6821905" y="4848727"/>
+            <a:off x="6821905" y="4642987"/>
             <a:ext cx="4030579" cy="0"/>
           </a:xfrm>
           <a:prstGeom prst="line">
             <a:avLst/>
           </a:prstGeom>
+          <a:ln w="19050"/>
         </p:spPr>
         <p:style>
           <a:lnRef idx="1">
@@ -10500,12 +10453,13 @@
         </p:nvCxnSpPr>
         <p:spPr>
           <a:xfrm>
-            <a:off x="7182853" y="2947737"/>
-            <a:ext cx="3669631" cy="0"/>
+            <a:off x="6821905" y="2822007"/>
+            <a:ext cx="4030579" cy="0"/>
           </a:xfrm>
           <a:prstGeom prst="line">
             <a:avLst/>
           </a:prstGeom>
+          <a:ln w="19050"/>
         </p:spPr>
         <p:style>
           <a:lnRef idx="1">
@@ -10536,8 +10490,8 @@
         </p:nvSpPr>
         <p:spPr>
           <a:xfrm>
-            <a:off x="11068734" y="2763071"/>
-            <a:ext cx="535724" cy="369332"/>
+            <a:off x="11068734" y="2637341"/>
+            <a:ext cx="753732" cy="369332"/>
           </a:xfrm>
           <a:prstGeom prst="rect">
             <a:avLst/>
@@ -10552,7 +10506,7 @@
           <a:p>
             <a:r>
               <a:rPr lang="fr-FR" dirty="0"/>
-              <a:t>100</a:t>
+              <a:t>100 %</a:t>
             </a:r>
             <a:endParaRPr lang="en-US" dirty="0"/>
           </a:p>
@@ -10572,8 +10526,8 @@
         </p:nvSpPr>
         <p:spPr>
           <a:xfrm>
-            <a:off x="11094803" y="4664061"/>
-            <a:ext cx="301686" cy="369332"/>
+            <a:off x="11094803" y="4458321"/>
+            <a:ext cx="519694" cy="369332"/>
           </a:xfrm>
           <a:prstGeom prst="rect">
             <a:avLst/>
@@ -10588,7 +10542,7 @@
           <a:p>
             <a:r>
               <a:rPr lang="fr-FR" dirty="0"/>
-              <a:t>0</a:t>
+              <a:t>0 %</a:t>
             </a:r>
             <a:endParaRPr lang="en-US" dirty="0"/>
           </a:p>
@@ -10610,12 +10564,13 @@
         </p:nvCxnSpPr>
         <p:spPr>
           <a:xfrm>
-            <a:off x="9444789" y="3693695"/>
+            <a:off x="9444789" y="3316505"/>
             <a:ext cx="1407695" cy="0"/>
           </a:xfrm>
           <a:prstGeom prst="line">
             <a:avLst/>
           </a:prstGeom>
+          <a:ln w="19050"/>
         </p:spPr>
         <p:style>
           <a:lnRef idx="1">
@@ -10646,8 +10601,8 @@
         </p:nvSpPr>
         <p:spPr>
           <a:xfrm>
-            <a:off x="11068734" y="3509029"/>
-            <a:ext cx="418704" cy="369332"/>
+            <a:off x="11068734" y="3131839"/>
+            <a:ext cx="928459" cy="369332"/>
           </a:xfrm>
           <a:prstGeom prst="rect">
             <a:avLst/>
@@ -10662,7 +10617,7 @@
           <a:p>
             <a:r>
               <a:rPr lang="fr-FR" dirty="0"/>
-              <a:t>65</a:t>
+              <a:t>73,58 %</a:t>
             </a:r>
             <a:endParaRPr lang="en-US" dirty="0"/>
           </a:p>
@@ -10677,18 +10632,20 @@
               </a:ext>
             </a:extLst>
           </p:cNvPr>
-          <p:cNvCxnSpPr/>
+          <p:cNvCxnSpPr>
+            <a:cxnSpLocks/>
+          </p:cNvCxnSpPr>
           <p:nvPr/>
         </p:nvCxnSpPr>
         <p:spPr>
           <a:xfrm>
-            <a:off x="10563726" y="2947737"/>
-            <a:ext cx="0" cy="745958"/>
+            <a:off x="10723746" y="2822007"/>
+            <a:ext cx="0" cy="494498"/>
           </a:xfrm>
           <a:prstGeom prst="straightConnector1">
             <a:avLst/>
           </a:prstGeom>
-          <a:ln>
+          <a:ln w="19050">
             <a:headEnd type="triangle"/>
             <a:tailEnd type="triangle"/>
           </a:ln>
@@ -10724,13 +10681,13 @@
         </p:nvCxnSpPr>
         <p:spPr>
           <a:xfrm>
-            <a:off x="10563726" y="3652378"/>
-            <a:ext cx="0" cy="1196349"/>
+            <a:off x="10723746" y="3316505"/>
+            <a:ext cx="0" cy="1326482"/>
           </a:xfrm>
           <a:prstGeom prst="straightConnector1">
             <a:avLst/>
           </a:prstGeom>
-          <a:ln>
+          <a:ln w="19050">
             <a:headEnd type="triangle"/>
             <a:tailEnd type="triangle"/>
           </a:ln>
@@ -11888,16 +11845,27 @@
             <p:ph type="title"/>
           </p:nvPr>
         </p:nvSpPr>
-        <p:spPr/>
-        <p:txBody>
-          <a:bodyPr/>
-          <a:lstStyle/>
-          <a:p>
-            <a:r>
-              <a:rPr lang="fr-FR" dirty="0"/>
+        <p:spPr>
+          <a:xfrm>
+            <a:off x="838200" y="365125"/>
+            <a:ext cx="10515600" cy="823595"/>
+          </a:xfrm>
+        </p:spPr>
+        <p:txBody>
+          <a:bodyPr vert="horz" lIns="91440" tIns="45720" rIns="91440" bIns="45720" rtlCol="0" anchor="t">
+            <a:normAutofit/>
+          </a:bodyPr>
+          <a:lstStyle/>
+          <a:p>
+            <a:r>
+              <a:rPr lang="fr-FR" dirty="0">
+                <a:cs typeface="Calibri Light"/>
+              </a:rPr>
               <a:t>Moyennes Mobiles</a:t>
             </a:r>
-            <a:endParaRPr lang="en-US" dirty="0"/>
+            <a:endParaRPr lang="en-US" dirty="0">
+              <a:cs typeface="Calibri Light"/>
+            </a:endParaRPr>
           </a:p>
         </p:txBody>
       </p:sp>
@@ -11917,7 +11885,12 @@
             <p:ph idx="1"/>
           </p:nvPr>
         </p:nvSpPr>
-        <p:spPr/>
+        <p:spPr>
+          <a:xfrm>
+            <a:off x="838200" y="1253331"/>
+            <a:ext cx="10515600" cy="1352709"/>
+          </a:xfrm>
+        </p:spPr>
         <p:txBody>
           <a:bodyPr/>
           <a:lstStyle/>
@@ -11970,6 +11943,36 @@
           </a:p>
         </p:txBody>
       </p:sp>
+      <p:pic>
+        <p:nvPicPr>
+          <p:cNvPr id="5" name="Picture 4">
+            <a:extLst>
+              <a:ext uri="{FF2B5EF4-FFF2-40B4-BE49-F238E27FC236}">
+                <a16:creationId xmlns:a16="http://schemas.microsoft.com/office/drawing/2014/main" id="{8966AECE-0DF3-4B81-8C98-33861B6AD3E7}"/>
+              </a:ext>
+            </a:extLst>
+          </p:cNvPr>
+          <p:cNvPicPr>
+            <a:picLocks noChangeAspect="1"/>
+          </p:cNvPicPr>
+          <p:nvPr/>
+        </p:nvPicPr>
+        <p:blipFill>
+          <a:blip r:embed="rId2"/>
+          <a:stretch>
+            <a:fillRect/>
+          </a:stretch>
+        </p:blipFill>
+        <p:spPr>
+          <a:xfrm>
+            <a:off x="1451610" y="2794476"/>
+            <a:ext cx="8991600" cy="3190875"/>
+          </a:xfrm>
+          <a:prstGeom prst="rect">
+            <a:avLst/>
+          </a:prstGeom>
+        </p:spPr>
+      </p:pic>
     </p:spTree>
     <p:extLst>
       <p:ext uri="{BB962C8B-B14F-4D97-AF65-F5344CB8AC3E}">
@@ -12207,6 +12210,259 @@
                 <a:sym typeface="Wingdings" panose="05000000000000000000" pitchFamily="2" charset="2"/>
               </a:rPr>
               <a:t>égo</a:t>
+            </a:r>
+            <a:r>
+              <a:rPr lang="en-US" dirty="0">
+                <a:sym typeface="Wingdings" panose="05000000000000000000" pitchFamily="2" charset="2"/>
+              </a:rPr>
+              <a:t>, </a:t>
+            </a:r>
+            <a:r>
+              <a:rPr lang="en-US" dirty="0" err="1">
+                <a:sym typeface="Wingdings" panose="05000000000000000000" pitchFamily="2" charset="2"/>
+              </a:rPr>
+              <a:t>si</a:t>
+            </a:r>
+            <a:r>
+              <a:rPr lang="en-US" dirty="0">
+                <a:sym typeface="Wingdings" panose="05000000000000000000" pitchFamily="2" charset="2"/>
+              </a:rPr>
+              <a:t> </a:t>
+            </a:r>
+            <a:r>
+              <a:rPr lang="en-US" dirty="0" err="1">
+                <a:sym typeface="Wingdings" panose="05000000000000000000" pitchFamily="2" charset="2"/>
+              </a:rPr>
+              <a:t>l’action</a:t>
+            </a:r>
+            <a:r>
+              <a:rPr lang="en-US" dirty="0">
+                <a:sym typeface="Wingdings" panose="05000000000000000000" pitchFamily="2" charset="2"/>
+              </a:rPr>
+              <a:t> </a:t>
+            </a:r>
+            <a:r>
+              <a:rPr lang="en-US" dirty="0" err="1">
+                <a:sym typeface="Wingdings" panose="05000000000000000000" pitchFamily="2" charset="2"/>
+              </a:rPr>
+              <a:t>baisse</a:t>
+            </a:r>
+            <a:r>
+              <a:rPr lang="en-US" dirty="0">
+                <a:sym typeface="Wingdings" panose="05000000000000000000" pitchFamily="2" charset="2"/>
+              </a:rPr>
+              <a:t>, </a:t>
+            </a:r>
+            <a:r>
+              <a:rPr lang="en-US" dirty="0" err="1">
+                <a:sym typeface="Wingdings" panose="05000000000000000000" pitchFamily="2" charset="2"/>
+              </a:rPr>
+              <a:t>c’est</a:t>
+            </a:r>
+            <a:r>
+              <a:rPr lang="en-US" dirty="0">
+                <a:sym typeface="Wingdings" panose="05000000000000000000" pitchFamily="2" charset="2"/>
+              </a:rPr>
+              <a:t> </a:t>
+            </a:r>
+            <a:r>
+              <a:rPr lang="en-US" dirty="0" err="1">
+                <a:sym typeface="Wingdings" panose="05000000000000000000" pitchFamily="2" charset="2"/>
+              </a:rPr>
+              <a:t>qu’on</a:t>
+            </a:r>
+            <a:r>
+              <a:rPr lang="en-US" dirty="0">
+                <a:sym typeface="Wingdings" panose="05000000000000000000" pitchFamily="2" charset="2"/>
+              </a:rPr>
+              <a:t> </a:t>
+            </a:r>
+            <a:r>
+              <a:rPr lang="en-US" dirty="0" err="1">
+                <a:sym typeface="Wingdings" panose="05000000000000000000" pitchFamily="2" charset="2"/>
+              </a:rPr>
+              <a:t>s’es</a:t>
+            </a:r>
+            <a:r>
+              <a:rPr lang="en-US" dirty="0">
+                <a:sym typeface="Wingdings" panose="05000000000000000000" pitchFamily="2" charset="2"/>
+              </a:rPr>
+              <a:t> </a:t>
+            </a:r>
+            <a:r>
+              <a:rPr lang="en-US" dirty="0" err="1">
+                <a:sym typeface="Wingdings" panose="05000000000000000000" pitchFamily="2" charset="2"/>
+              </a:rPr>
+              <a:t>trompé</a:t>
+            </a:r>
+            <a:r>
+              <a:rPr lang="en-US" dirty="0">
+                <a:sym typeface="Wingdings" panose="05000000000000000000" pitchFamily="2" charset="2"/>
+              </a:rPr>
+              <a:t>, il faut </a:t>
+            </a:r>
+            <a:r>
+              <a:rPr lang="en-US" dirty="0" err="1">
+                <a:sym typeface="Wingdings" panose="05000000000000000000" pitchFamily="2" charset="2"/>
+              </a:rPr>
+              <a:t>vendre</a:t>
+            </a:r>
+            <a:r>
+              <a:rPr lang="en-US" dirty="0">
+                <a:sym typeface="Wingdings" panose="05000000000000000000" pitchFamily="2" charset="2"/>
+              </a:rPr>
+              <a:t>.</a:t>
+            </a:r>
+          </a:p>
+          <a:p>
+            <a:pPr marL="457200" lvl="1" indent="0">
+              <a:buNone/>
+            </a:pPr>
+            <a:endParaRPr lang="en-US" dirty="0">
+              <a:sym typeface="Wingdings" panose="05000000000000000000" pitchFamily="2" charset="2"/>
+            </a:endParaRPr>
+          </a:p>
+          <a:p>
+            <a:pPr marL="457200" lvl="1" indent="0">
+              <a:buNone/>
+            </a:pPr>
+            <a:r>
+              <a:rPr lang="en-US" dirty="0">
+                <a:sym typeface="Wingdings" panose="05000000000000000000" pitchFamily="2" charset="2"/>
+              </a:rPr>
+              <a:t>On </a:t>
+            </a:r>
+            <a:r>
+              <a:rPr lang="en-US" dirty="0" err="1">
+                <a:sym typeface="Wingdings" panose="05000000000000000000" pitchFamily="2" charset="2"/>
+              </a:rPr>
+              <a:t>gagne</a:t>
+            </a:r>
+            <a:r>
+              <a:rPr lang="en-US" dirty="0">
+                <a:sym typeface="Wingdings" panose="05000000000000000000" pitchFamily="2" charset="2"/>
+              </a:rPr>
+              <a:t> de </a:t>
+            </a:r>
+            <a:r>
+              <a:rPr lang="en-US" dirty="0" err="1">
+                <a:sym typeface="Wingdings" panose="05000000000000000000" pitchFamily="2" charset="2"/>
+              </a:rPr>
+              <a:t>l’argent</a:t>
+            </a:r>
+            <a:r>
+              <a:rPr lang="en-US" dirty="0">
+                <a:sym typeface="Wingdings" panose="05000000000000000000" pitchFamily="2" charset="2"/>
+              </a:rPr>
+              <a:t> </a:t>
+            </a:r>
+            <a:r>
+              <a:rPr lang="en-US" dirty="0" err="1">
+                <a:sym typeface="Wingdings" panose="05000000000000000000" pitchFamily="2" charset="2"/>
+              </a:rPr>
+              <a:t>en</a:t>
+            </a:r>
+            <a:r>
+              <a:rPr lang="en-US" dirty="0">
+                <a:sym typeface="Wingdings" panose="05000000000000000000" pitchFamily="2" charset="2"/>
+              </a:rPr>
+              <a:t> se </a:t>
+            </a:r>
+            <a:r>
+              <a:rPr lang="en-US" dirty="0" err="1">
+                <a:sym typeface="Wingdings" panose="05000000000000000000" pitchFamily="2" charset="2"/>
+              </a:rPr>
+              <a:t>trompant</a:t>
+            </a:r>
+            <a:r>
+              <a:rPr lang="en-US" dirty="0">
+                <a:sym typeface="Wingdings" panose="05000000000000000000" pitchFamily="2" charset="2"/>
+              </a:rPr>
+              <a:t> </a:t>
+            </a:r>
+            <a:r>
+              <a:rPr lang="en-US" dirty="0" err="1">
+                <a:sym typeface="Wingdings" panose="05000000000000000000" pitchFamily="2" charset="2"/>
+              </a:rPr>
+              <a:t>souvent</a:t>
+            </a:r>
+            <a:r>
+              <a:rPr lang="en-US" dirty="0">
+                <a:sym typeface="Wingdings" panose="05000000000000000000" pitchFamily="2" charset="2"/>
+              </a:rPr>
+              <a:t>, il </a:t>
+            </a:r>
+            <a:r>
+              <a:rPr lang="en-US" dirty="0" err="1">
+                <a:sym typeface="Wingdings" panose="05000000000000000000" pitchFamily="2" charset="2"/>
+              </a:rPr>
+              <a:t>suffit</a:t>
+            </a:r>
+            <a:r>
+              <a:rPr lang="en-US" dirty="0">
+                <a:sym typeface="Wingdings" panose="05000000000000000000" pitchFamily="2" charset="2"/>
+              </a:rPr>
+              <a:t> de </a:t>
+            </a:r>
+            <a:r>
+              <a:rPr lang="en-US" dirty="0" err="1">
+                <a:sym typeface="Wingdings" panose="05000000000000000000" pitchFamily="2" charset="2"/>
+              </a:rPr>
+              <a:t>gagner</a:t>
+            </a:r>
+            <a:r>
+              <a:rPr lang="en-US" dirty="0">
+                <a:sym typeface="Wingdings" panose="05000000000000000000" pitchFamily="2" charset="2"/>
+              </a:rPr>
+              <a:t> beaucoup </a:t>
+            </a:r>
+            <a:r>
+              <a:rPr lang="en-US" dirty="0" err="1">
+                <a:sym typeface="Wingdings" panose="05000000000000000000" pitchFamily="2" charset="2"/>
+              </a:rPr>
+              <a:t>quand</a:t>
+            </a:r>
+            <a:r>
+              <a:rPr lang="en-US" dirty="0">
+                <a:sym typeface="Wingdings" panose="05000000000000000000" pitchFamily="2" charset="2"/>
+              </a:rPr>
+              <a:t> on a raison, et </a:t>
+            </a:r>
+            <a:r>
+              <a:rPr lang="en-US" dirty="0" err="1">
+                <a:sym typeface="Wingdings" panose="05000000000000000000" pitchFamily="2" charset="2"/>
+              </a:rPr>
+              <a:t>perdre</a:t>
+            </a:r>
+            <a:r>
+              <a:rPr lang="en-US" dirty="0">
+                <a:sym typeface="Wingdings" panose="05000000000000000000" pitchFamily="2" charset="2"/>
+              </a:rPr>
+              <a:t> </a:t>
+            </a:r>
+            <a:r>
+              <a:rPr lang="en-US" dirty="0" err="1">
+                <a:sym typeface="Wingdings" panose="05000000000000000000" pitchFamily="2" charset="2"/>
+              </a:rPr>
+              <a:t>peu</a:t>
+            </a:r>
+            <a:r>
+              <a:rPr lang="en-US" dirty="0">
+                <a:sym typeface="Wingdings" panose="05000000000000000000" pitchFamily="2" charset="2"/>
+              </a:rPr>
+              <a:t> </a:t>
+            </a:r>
+            <a:r>
+              <a:rPr lang="en-US" dirty="0" err="1">
+                <a:sym typeface="Wingdings" panose="05000000000000000000" pitchFamily="2" charset="2"/>
+              </a:rPr>
+              <a:t>quand</a:t>
+            </a:r>
+            <a:r>
+              <a:rPr lang="en-US" dirty="0">
+                <a:sym typeface="Wingdings" panose="05000000000000000000" pitchFamily="2" charset="2"/>
+              </a:rPr>
+              <a:t> on a tort.</a:t>
             </a:r>
             <a:endParaRPr lang="en-US" dirty="0"/>
           </a:p>

</xml_diff>